<commit_message>
Update Week 09 Software Implementation.pptx
</commit_message>
<xml_diff>
--- a/Slides/Week 09 Software Implementation.pptx
+++ b/Slides/Week 09 Software Implementation.pptx
@@ -236,7 +236,7 @@
           <a:p>
             <a:fld id="{0FEC1AAB-5E7C-43B3-93F1-3B00C2708E32}" type="datetimeFigureOut">
               <a:rPr lang="th-TH" smtClean="0"/>
-              <a:t>08/10/61</a:t>
+              <a:t>11/10/62</a:t>
             </a:fld>
             <a:endParaRPr lang="th-TH"/>
           </a:p>
@@ -414,7 +414,7 @@
           <a:p>
             <a:fld id="{5B1B5456-0566-42F4-BCC8-DF5300E15663}" type="datetimeFigureOut">
               <a:rPr lang="th-TH" smtClean="0"/>
-              <a:t>08/10/61</a:t>
+              <a:t>11/10/62</a:t>
             </a:fld>
             <a:endParaRPr lang="th-TH"/>
           </a:p>
@@ -1024,7 +1024,7 @@
           <a:p>
             <a:r>
               <a:rPr lang="th-TH"/>
-              <a:t>2561.10.09</a:t>
+              <a:t>2562.10.11</a:t>
             </a:r>
           </a:p>
         </p:txBody>
@@ -1197,7 +1197,7 @@
           <a:p>
             <a:r>
               <a:rPr lang="th-TH"/>
-              <a:t>2561.10.09</a:t>
+              <a:t>2562.10.11</a:t>
             </a:r>
           </a:p>
         </p:txBody>
@@ -1380,7 +1380,7 @@
           <a:p>
             <a:r>
               <a:rPr lang="th-TH"/>
-              <a:t>2561.10.09</a:t>
+              <a:t>2562.10.11</a:t>
             </a:r>
           </a:p>
         </p:txBody>
@@ -1618,7 +1618,7 @@
           <a:p>
             <a:r>
               <a:rPr lang="th-TH"/>
-              <a:t>2561.10.09</a:t>
+              <a:t>2562.10.11</a:t>
             </a:r>
             <a:endParaRPr lang="th-TH" dirty="0"/>
           </a:p>
@@ -1889,7 +1889,7 @@
           <a:p>
             <a:r>
               <a:rPr lang="th-TH"/>
-              <a:t>2561.10.09</a:t>
+              <a:t>2562.10.11</a:t>
             </a:r>
           </a:p>
         </p:txBody>
@@ -2130,7 +2130,7 @@
           <a:p>
             <a:r>
               <a:rPr lang="th-TH"/>
-              <a:t>2561.10.09</a:t>
+              <a:t>2562.10.11</a:t>
             </a:r>
           </a:p>
         </p:txBody>
@@ -2500,7 +2500,7 @@
           <a:p>
             <a:r>
               <a:rPr lang="th-TH"/>
-              <a:t>2561.10.09</a:t>
+              <a:t>2562.10.11</a:t>
             </a:r>
           </a:p>
         </p:txBody>
@@ -2626,7 +2626,7 @@
           <a:p>
             <a:r>
               <a:rPr lang="th-TH"/>
-              <a:t>2561.10.09</a:t>
+              <a:t>2562.10.11</a:t>
             </a:r>
           </a:p>
         </p:txBody>
@@ -2724,7 +2724,7 @@
           <a:p>
             <a:r>
               <a:rPr lang="th-TH"/>
-              <a:t>2561.10.09</a:t>
+              <a:t>2562.10.11</a:t>
             </a:r>
           </a:p>
         </p:txBody>
@@ -3004,7 +3004,7 @@
           <a:p>
             <a:r>
               <a:rPr lang="th-TH"/>
-              <a:t>2561.10.09</a:t>
+              <a:t>2562.10.11</a:t>
             </a:r>
           </a:p>
         </p:txBody>
@@ -3264,7 +3264,7 @@
           <a:p>
             <a:r>
               <a:rPr lang="th-TH"/>
-              <a:t>2561.10.09</a:t>
+              <a:t>2562.10.11</a:t>
             </a:r>
           </a:p>
         </p:txBody>
@@ -3480,7 +3480,7 @@
           <a:p>
             <a:r>
               <a:rPr lang="th-TH"/>
-              <a:t>2561.10.09</a:t>
+              <a:t>2562.10.11</a:t>
             </a:r>
           </a:p>
         </p:txBody>
@@ -4354,7 +4354,7 @@
           <a:p>
             <a:r>
               <a:rPr lang="th-TH"/>
-              <a:t>2561.10.09</a:t>
+              <a:t>2562.10.11</a:t>
             </a:r>
             <a:endParaRPr lang="th-TH" dirty="0"/>
           </a:p>
@@ -4547,7 +4547,7 @@
           <a:p>
             <a:r>
               <a:rPr lang="th-TH"/>
-              <a:t>2561.10.09</a:t>
+              <a:t>2562.10.11</a:t>
             </a:r>
             <a:endParaRPr lang="th-TH" dirty="0"/>
           </a:p>
@@ -5050,7 +5050,7 @@
           <a:p>
             <a:r>
               <a:rPr lang="th-TH"/>
-              <a:t>2561.10.09</a:t>
+              <a:t>2562.10.11</a:t>
             </a:r>
             <a:endParaRPr lang="th-TH" dirty="0"/>
           </a:p>
@@ -5398,7 +5398,7 @@
           <a:p>
             <a:r>
               <a:rPr lang="th-TH"/>
-              <a:t>2561.10.09</a:t>
+              <a:t>2562.10.11</a:t>
             </a:r>
             <a:endParaRPr lang="th-TH" dirty="0"/>
           </a:p>
@@ -5596,7 +5596,7 @@
           <a:p>
             <a:r>
               <a:rPr lang="th-TH"/>
-              <a:t>2561.10.09</a:t>
+              <a:t>2562.10.11</a:t>
             </a:r>
             <a:endParaRPr lang="th-TH" dirty="0"/>
           </a:p>
@@ -5787,7 +5787,7 @@
           <a:p>
             <a:r>
               <a:rPr lang="th-TH"/>
-              <a:t>2561.10.09</a:t>
+              <a:t>2562.10.11</a:t>
             </a:r>
             <a:endParaRPr lang="th-TH" dirty="0"/>
           </a:p>
@@ -6026,7 +6026,7 @@
           <a:p>
             <a:r>
               <a:rPr lang="th-TH"/>
-              <a:t>2561.10.09</a:t>
+              <a:t>2562.10.11</a:t>
             </a:r>
             <a:endParaRPr lang="th-TH" dirty="0"/>
           </a:p>
@@ -6281,7 +6281,7 @@
           <a:p>
             <a:r>
               <a:rPr lang="th-TH"/>
-              <a:t>2561.10.09</a:t>
+              <a:t>2562.10.11</a:t>
             </a:r>
             <a:endParaRPr lang="th-TH" dirty="0"/>
           </a:p>
@@ -6570,7 +6570,7 @@
           <a:p>
             <a:r>
               <a:rPr lang="th-TH"/>
-              <a:t>2561.10.09</a:t>
+              <a:t>2562.10.11</a:t>
             </a:r>
             <a:endParaRPr lang="th-TH" dirty="0"/>
           </a:p>
@@ -6701,8 +6701,8 @@
         </p:blipFill>
         <p:spPr>
           <a:xfrm>
-            <a:off x="1804197" y="1406828"/>
-            <a:ext cx="8230313" cy="4523624"/>
+            <a:off x="1858297" y="1444750"/>
+            <a:ext cx="7714097" cy="4239896"/>
           </a:xfrm>
           <a:prstGeom prst="rect">
             <a:avLst/>
@@ -6761,7 +6761,7 @@
           <a:p>
             <a:r>
               <a:rPr lang="th-TH"/>
-              <a:t>2561.10.09</a:t>
+              <a:t>2562.10.11</a:t>
             </a:r>
             <a:endParaRPr lang="th-TH" dirty="0"/>
           </a:p>
@@ -6981,7 +6981,7 @@
           <a:p>
             <a:r>
               <a:rPr lang="th-TH"/>
-              <a:t>2561.10.09</a:t>
+              <a:t>2562.10.11</a:t>
             </a:r>
             <a:endParaRPr lang="th-TH" dirty="0"/>
           </a:p>
@@ -7332,7 +7332,7 @@
           <a:p>
             <a:r>
               <a:rPr lang="th-TH"/>
-              <a:t>2561.10.09</a:t>
+              <a:t>2562.10.11</a:t>
             </a:r>
             <a:endParaRPr lang="th-TH" dirty="0"/>
           </a:p>
@@ -7736,7 +7736,7 @@
           <a:p>
             <a:r>
               <a:rPr lang="th-TH"/>
-              <a:t>2561.10.09</a:t>
+              <a:t>2562.10.11</a:t>
             </a:r>
             <a:endParaRPr lang="th-TH" dirty="0"/>
           </a:p>
@@ -7869,15 +7869,7 @@
                   <a:srgbClr val="3366FF"/>
                 </a:solidFill>
               </a:rPr>
-              <a:t>แสดงการจัดวางระบบโดย</a:t>
-            </a:r>
-            <a:r>
-              <a:rPr lang="th-TH">
-                <a:solidFill>
-                  <a:srgbClr val="3366FF"/>
-                </a:solidFill>
-              </a:rPr>
-              <a:t>ให้ </a:t>
+              <a:t>แสดงการจัดวางระบบโดยให้ </a:t>
             </a:r>
             <a:r>
               <a:rPr lang="en-US" dirty="0">
@@ -7899,7 +7891,7 @@
           <a:p>
             <a:pPr marL="512763" indent="-512763"/>
             <a:r>
-              <a:rPr lang="th-TH">
+              <a:rPr lang="th-TH" dirty="0">
                 <a:solidFill>
                   <a:srgbClr val="3366FF"/>
                 </a:solidFill>
@@ -7920,15 +7912,7 @@
                   <a:srgbClr val="3366FF"/>
                 </a:solidFill>
               </a:rPr>
-              <a:t>วัตถุเหล่านี้จะแสดงรวมกันเป็น</a:t>
-            </a:r>
-            <a:r>
-              <a:rPr lang="th-TH">
-                <a:solidFill>
-                  <a:srgbClr val="3366FF"/>
-                </a:solidFill>
-              </a:rPr>
-              <a:t>แพคเกจ </a:t>
+              <a:t>วัตถุเหล่านี้จะแสดงรวมกันเป็นแพคเกจ </a:t>
             </a:r>
             <a:r>
               <a:rPr lang="en-US" dirty="0">
@@ -7944,15 +7928,7 @@
                   <a:srgbClr val="3366FF"/>
                 </a:solidFill>
               </a:rPr>
-              <a:t>โดยมี</a:t>
-            </a:r>
-            <a:r>
-              <a:rPr lang="th-TH">
-                <a:solidFill>
-                  <a:srgbClr val="3366FF"/>
-                </a:solidFill>
-              </a:rPr>
-              <a:t>แนวคิด </a:t>
+              <a:t>โดยมีแนวคิด </a:t>
             </a:r>
             <a:r>
               <a:rPr lang="en-US" dirty="0">
@@ -8060,7 +8036,7 @@
           <a:p>
             <a:r>
               <a:rPr lang="th-TH"/>
-              <a:t>2561.10.09</a:t>
+              <a:t>2562.10.11</a:t>
             </a:r>
             <a:endParaRPr lang="th-TH" dirty="0"/>
           </a:p>
@@ -8184,37 +8160,62 @@
           <a:bodyPr/>
           <a:lstStyle/>
           <a:p>
-            <a:r>
-              <a:rPr lang="th-TH" dirty="0"/>
+            <a:pPr marL="512763" indent="-512763"/>
+            <a:r>
+              <a:rPr lang="th-TH" dirty="0">
+                <a:solidFill>
+                  <a:srgbClr val="3366FF"/>
+                </a:solidFill>
+              </a:rPr>
               <a:t>แสดงลำดับการโต้ตอบของอ็อบ</a:t>
             </a:r>
             <a:r>
-              <a:rPr lang="th-TH" dirty="0" err="1"/>
+              <a:rPr lang="th-TH" dirty="0" err="1">
+                <a:solidFill>
+                  <a:srgbClr val="3366FF"/>
+                </a:solidFill>
+              </a:rPr>
               <a:t>เจ็กต์</a:t>
             </a:r>
             <a:r>
-              <a:rPr lang="th-TH" dirty="0"/>
+              <a:rPr lang="th-TH" dirty="0">
+                <a:solidFill>
+                  <a:srgbClr val="3366FF"/>
+                </a:solidFill>
+              </a:rPr>
               <a:t>ที่เกิดขึ้นตามเวลา</a:t>
             </a:r>
           </a:p>
           <a:p>
-            <a:pPr lvl="1"/>
-            <a:r>
-              <a:rPr lang="th-TH" dirty="0"/>
+            <a:pPr marL="969963" lvl="1" indent="-512763"/>
+            <a:r>
+              <a:rPr lang="th-TH" dirty="0">
+                <a:solidFill>
+                  <a:srgbClr val="CC0066"/>
+                </a:solidFill>
+              </a:rPr>
               <a:t>วัตถุเรียงตามแนวนอนอยู่ด้านบน</a:t>
             </a:r>
           </a:p>
           <a:p>
-            <a:pPr lvl="1"/>
-            <a:r>
-              <a:rPr lang="th-TH" dirty="0"/>
+            <a:pPr marL="969963" lvl="1" indent="-512763"/>
+            <a:r>
+              <a:rPr lang="th-TH" dirty="0">
+                <a:solidFill>
+                  <a:srgbClr val="CC0066"/>
+                </a:solidFill>
+              </a:rPr>
               <a:t>เวลาจะแสดงในแนวตั้ง แสดงลำดับเหตุการณ์จากบนลงล่าง</a:t>
             </a:r>
           </a:p>
           <a:p>
-            <a:pPr lvl="1"/>
-            <a:r>
-              <a:rPr lang="th-TH" dirty="0"/>
+            <a:pPr marL="969963" lvl="1" indent="-512763"/>
+            <a:r>
+              <a:rPr lang="th-TH" dirty="0">
+                <a:solidFill>
+                  <a:srgbClr val="CC0066"/>
+                </a:solidFill>
+              </a:rPr>
               <a:t>ปฏิสัมพันธ์แสดงด้วยลูกศรที่มีป้ายกำกับ</a:t>
             </a:r>
           </a:p>
@@ -8226,9 +8227,13 @@
             </a:r>
           </a:p>
           <a:p>
-            <a:pPr lvl="1"/>
-            <a:r>
-              <a:rPr lang="th-TH" dirty="0"/>
+            <a:pPr marL="969963" lvl="1" indent="-512763"/>
+            <a:r>
+              <a:rPr lang="th-TH" dirty="0">
+                <a:solidFill>
+                  <a:srgbClr val="CC0066"/>
+                </a:solidFill>
+              </a:rPr>
               <a:t>รูปสี่เหลี่ยมผืนผ้าบาง ๆ ในเส้นชีวิตของวัตถุ แสดงถึงระยะเวลาที่วัตถุเป็นตัวควบคุมในระบบ</a:t>
             </a:r>
           </a:p>
@@ -8286,7 +8291,7 @@
           <a:p>
             <a:r>
               <a:rPr lang="th-TH"/>
-              <a:t>2561.10.09</a:t>
+              <a:t>2562.10.11</a:t>
             </a:r>
             <a:endParaRPr lang="th-TH" dirty="0"/>
           </a:p>
@@ -8475,7 +8480,7 @@
           <a:p>
             <a:r>
               <a:rPr lang="th-TH"/>
-              <a:t>2561.10.09</a:t>
+              <a:t>2562.10.11</a:t>
             </a:r>
             <a:endParaRPr lang="th-TH" dirty="0"/>
           </a:p>
@@ -8597,95 +8602,164 @@
         <p:spPr/>
         <p:txBody>
           <a:bodyPr>
-            <a:normAutofit fontScale="92500"/>
+            <a:normAutofit fontScale="92500" lnSpcReduction="20000"/>
           </a:bodyPr>
           <a:lstStyle/>
           <a:p>
-            <a:r>
-              <a:rPr lang="th-TH" dirty="0"/>
+            <a:pPr marL="512763" indent="-512763"/>
+            <a:r>
+              <a:rPr lang="th-TH" sz="4300" dirty="0">
+                <a:solidFill>
+                  <a:srgbClr val="3366FF"/>
+                </a:solidFill>
+              </a:rPr>
               <a:t>แผนผังสถานะ</a:t>
             </a:r>
             <a:r>
-              <a:rPr lang="en-US" dirty="0"/>
+              <a:rPr lang="en-US" sz="4300" dirty="0">
+                <a:solidFill>
+                  <a:srgbClr val="3366FF"/>
+                </a:solidFill>
+              </a:rPr>
               <a:t> (state diagram) </a:t>
             </a:r>
             <a:r>
-              <a:rPr lang="th-TH" dirty="0"/>
+              <a:rPr lang="th-TH" sz="4300" dirty="0">
+                <a:solidFill>
+                  <a:srgbClr val="3366FF"/>
+                </a:solidFill>
+              </a:rPr>
               <a:t>ใช้เพื่อ</a:t>
             </a:r>
           </a:p>
           <a:p>
-            <a:pPr lvl="1"/>
-            <a:r>
-              <a:rPr lang="th-TH" dirty="0"/>
+            <a:pPr marL="969963" lvl="1" indent="-512763"/>
+            <a:r>
+              <a:rPr lang="th-TH" sz="3900" dirty="0">
+                <a:solidFill>
+                  <a:srgbClr val="CC0066"/>
+                </a:solidFill>
+              </a:rPr>
               <a:t>แสดงวิธีที่วัตถุตอบสนองต่อคำขอบริการต่าง ๆ</a:t>
             </a:r>
           </a:p>
           <a:p>
-            <a:pPr lvl="1"/>
-            <a:r>
-              <a:rPr lang="th-TH" dirty="0"/>
+            <a:pPr marL="969963" lvl="1" indent="-512763"/>
+            <a:r>
+              <a:rPr lang="th-TH" sz="3900" dirty="0">
+                <a:solidFill>
+                  <a:srgbClr val="CC0066"/>
+                </a:solidFill>
+              </a:rPr>
               <a:t>การเปลี่ยนสถานะที่เรียกใช้โดยคำขอเหล่านั้น</a:t>
             </a:r>
           </a:p>
           <a:p>
             <a:r>
-              <a:rPr lang="th-TH" dirty="0"/>
+              <a:rPr lang="th-TH" sz="4300" dirty="0">
+                <a:solidFill>
+                  <a:srgbClr val="3366FF"/>
+                </a:solidFill>
+              </a:rPr>
               <a:t>แผนผังสถานะเป็นโมเดลระดับสูง</a:t>
             </a:r>
           </a:p>
           <a:p>
-            <a:pPr lvl="1"/>
-            <a:r>
-              <a:rPr lang="th-TH" dirty="0"/>
+            <a:pPr marL="969963" lvl="1" indent="-512763"/>
+            <a:r>
+              <a:rPr lang="th-TH" sz="3900" dirty="0">
+                <a:solidFill>
+                  <a:srgbClr val="CC0066"/>
+                </a:solidFill>
+              </a:rPr>
               <a:t>แสดงพฤติกรรมในขณะทำงานของวัตถุ</a:t>
             </a:r>
           </a:p>
           <a:p>
             <a:r>
-              <a:rPr lang="th-TH" dirty="0"/>
+              <a:rPr lang="th-TH" sz="4300" dirty="0">
+                <a:solidFill>
+                  <a:srgbClr val="3366FF"/>
+                </a:solidFill>
+              </a:rPr>
               <a:t>ไม่จำเป็นต้องมีแผนภาพ</a:t>
             </a:r>
             <a:r>
-              <a:rPr lang="en-US" dirty="0"/>
+              <a:rPr lang="en-US" sz="4300" dirty="0">
+                <a:solidFill>
+                  <a:srgbClr val="3366FF"/>
+                </a:solidFill>
+              </a:rPr>
               <a:t> state diagram </a:t>
             </a:r>
             <a:r>
-              <a:rPr lang="th-TH" dirty="0"/>
+              <a:rPr lang="th-TH" sz="4300" dirty="0">
+                <a:solidFill>
+                  <a:srgbClr val="3366FF"/>
+                </a:solidFill>
+              </a:rPr>
               <a:t>สำหรับ</a:t>
             </a:r>
             <a:r>
-              <a:rPr lang="en-US" dirty="0"/>
+              <a:rPr lang="en-US" sz="4300" dirty="0">
+                <a:solidFill>
+                  <a:srgbClr val="3366FF"/>
+                </a:solidFill>
+              </a:rPr>
               <a:t> object </a:t>
             </a:r>
             <a:r>
-              <a:rPr lang="th-TH" dirty="0"/>
+              <a:rPr lang="th-TH" sz="4300" dirty="0">
+                <a:solidFill>
+                  <a:srgbClr val="3366FF"/>
+                </a:solidFill>
+              </a:rPr>
               <a:t>ทั้งหมดในระบบ </a:t>
             </a:r>
           </a:p>
           <a:p>
-            <a:pPr lvl="1"/>
-            <a:r>
-              <a:rPr lang="en-US" dirty="0"/>
+            <a:pPr marL="969963" lvl="1" indent="-512763"/>
+            <a:r>
+              <a:rPr lang="en-US" sz="3900" dirty="0">
+                <a:solidFill>
+                  <a:srgbClr val="CC0066"/>
+                </a:solidFill>
+              </a:rPr>
               <a:t>Object </a:t>
             </a:r>
             <a:r>
-              <a:rPr lang="th-TH" dirty="0"/>
+              <a:rPr lang="th-TH" sz="3900" dirty="0">
+                <a:solidFill>
+                  <a:srgbClr val="CC0066"/>
+                </a:solidFill>
+              </a:rPr>
               <a:t>จำนวนมากในระบบมีความเรียบง่าย</a:t>
             </a:r>
           </a:p>
           <a:p>
-            <a:pPr lvl="1"/>
-            <a:r>
-              <a:rPr lang="th-TH" dirty="0"/>
+            <a:pPr marL="969963" lvl="1" indent="-512763"/>
+            <a:r>
+              <a:rPr lang="th-TH" sz="3900" dirty="0">
+                <a:solidFill>
+                  <a:srgbClr val="CC0066"/>
+                </a:solidFill>
+              </a:rPr>
               <a:t>แบบจำลอง </a:t>
             </a:r>
             <a:r>
-              <a:rPr lang="en-US" dirty="0"/>
+              <a:rPr lang="en-US" sz="3900" dirty="0">
+                <a:solidFill>
+                  <a:srgbClr val="CC0066"/>
+                </a:solidFill>
+              </a:rPr>
               <a:t>state diagram </a:t>
             </a:r>
             <a:r>
-              <a:rPr lang="th-TH" dirty="0"/>
+              <a:rPr lang="th-TH" sz="3900" dirty="0">
+                <a:solidFill>
+                  <a:srgbClr val="CC0066"/>
+                </a:solidFill>
+              </a:rPr>
               <a:t>จะเพิ่มรายละเอียดที่ไม่จำเป็นให้กับการออกแบบ</a:t>
             </a:r>
           </a:p>
@@ -8743,7 +8817,7 @@
           <a:p>
             <a:r>
               <a:rPr lang="th-TH"/>
-              <a:t>2561.10.09</a:t>
+              <a:t>2562.10.11</a:t>
             </a:r>
             <a:endParaRPr lang="th-TH" dirty="0"/>
           </a:p>
@@ -8938,7 +9012,7 @@
           <a:p>
             <a:r>
               <a:rPr lang="th-TH"/>
-              <a:t>2561.10.09</a:t>
+              <a:t>2562.10.11</a:t>
             </a:r>
             <a:endParaRPr lang="th-TH" dirty="0"/>
           </a:p>
@@ -9118,7 +9192,7 @@
           <a:p>
             <a:r>
               <a:rPr lang="th-TH"/>
-              <a:t>2561.10.09</a:t>
+              <a:t>2562.10.11</a:t>
             </a:r>
           </a:p>
         </p:txBody>
@@ -9449,7 +9523,7 @@
           <a:p>
             <a:r>
               <a:rPr lang="th-TH"/>
-              <a:t>2561.10.09</a:t>
+              <a:t>2562.10.11</a:t>
             </a:r>
             <a:endParaRPr lang="th-TH" dirty="0"/>
           </a:p>
@@ -9803,7 +9877,7 @@
           <a:p>
             <a:r>
               <a:rPr lang="th-TH"/>
-              <a:t>2561.10.09</a:t>
+              <a:t>2562.10.11</a:t>
             </a:r>
             <a:endParaRPr lang="th-TH" dirty="0"/>
           </a:p>
@@ -10161,7 +10235,7 @@
           <a:p>
             <a:r>
               <a:rPr lang="th-TH"/>
-              <a:t>2561.10.09</a:t>
+              <a:t>2562.10.11</a:t>
             </a:r>
             <a:endParaRPr lang="th-TH" dirty="0"/>
           </a:p>
@@ -10527,7 +10601,7 @@
           <a:p>
             <a:r>
               <a:rPr lang="th-TH"/>
-              <a:t>2561.10.09</a:t>
+              <a:t>2562.10.11</a:t>
             </a:r>
             <a:endParaRPr lang="th-TH" dirty="0"/>
           </a:p>
@@ -10904,7 +10978,7 @@
           <a:p>
             <a:r>
               <a:rPr lang="th-TH"/>
-              <a:t>2561.10.09</a:t>
+              <a:t>2562.10.11</a:t>
             </a:r>
             <a:endParaRPr lang="th-TH" dirty="0"/>
           </a:p>
@@ -11497,7 +11571,7 @@
           <a:p>
             <a:r>
               <a:rPr lang="th-TH"/>
-              <a:t>2561.10.09</a:t>
+              <a:t>2562.10.11</a:t>
             </a:r>
             <a:endParaRPr lang="th-TH" dirty="0"/>
           </a:p>
@@ -11686,7 +11760,7 @@
           <a:p>
             <a:r>
               <a:rPr lang="th-TH"/>
-              <a:t>2561.10.09</a:t>
+              <a:t>2562.10.11</a:t>
             </a:r>
             <a:endParaRPr lang="th-TH" dirty="0"/>
           </a:p>
@@ -11881,7 +11955,7 @@
           <a:p>
             <a:r>
               <a:rPr lang="th-TH"/>
-              <a:t>2561.10.09</a:t>
+              <a:t>2562.10.11</a:t>
             </a:r>
             <a:endParaRPr lang="th-TH" dirty="0"/>
           </a:p>
@@ -12003,7 +12077,7 @@
         <p:spPr/>
         <p:txBody>
           <a:bodyPr vert="horz" lIns="91440" tIns="45720" rIns="91440" bIns="45720" rtlCol="0">
-            <a:normAutofit fontScale="92500" lnSpcReduction="20000"/>
+            <a:normAutofit fontScale="92500" lnSpcReduction="10000"/>
           </a:bodyPr>
           <a:lstStyle/>
           <a:p>
@@ -12030,23 +12104,7 @@
                   <a:srgbClr val="3366FF"/>
                 </a:solidFill>
               </a:rPr>
-              <a:t> ต้องแน่ใจว่าปัญหาด้านการออกแบบที่เรากำลังเจอ </a:t>
-            </a:r>
-            <a:endParaRPr lang="en-US" dirty="0">
-              <a:solidFill>
-                <a:srgbClr val="3366FF"/>
-              </a:solidFill>
-            </a:endParaRPr>
-          </a:p>
-          <a:p>
-            <a:pPr marL="512763" indent="-512763"/>
-            <a:r>
-              <a:rPr lang="th-TH" dirty="0">
-                <a:solidFill>
-                  <a:srgbClr val="3366FF"/>
-                </a:solidFill>
-              </a:rPr>
-              <a:t>มี </a:t>
+              <a:t> ต้องแน่ใจว่าปัญหาด้านการออกแบบที่เรากำลังเจอนั้นมี </a:t>
             </a:r>
             <a:r>
               <a:rPr lang="en-US" dirty="0">
@@ -12387,7 +12445,7 @@
           <a:p>
             <a:r>
               <a:rPr lang="th-TH"/>
-              <a:t>2561.10.09</a:t>
+              <a:t>2562.10.11</a:t>
             </a:r>
             <a:endParaRPr lang="th-TH" dirty="0"/>
           </a:p>
@@ -12567,7 +12625,7 @@
           <a:p>
             <a:r>
               <a:rPr lang="th-TH"/>
-              <a:t>2561.10.09</a:t>
+              <a:t>2562.10.11</a:t>
             </a:r>
           </a:p>
         </p:txBody>
@@ -12909,7 +12967,7 @@
           <a:p>
             <a:r>
               <a:rPr lang="th-TH"/>
-              <a:t>2561.10.09</a:t>
+              <a:t>2562.10.11</a:t>
             </a:r>
             <a:endParaRPr lang="th-TH" dirty="0"/>
           </a:p>
@@ -13085,7 +13143,7 @@
                   <a:srgbClr val="3366FF"/>
                 </a:solidFill>
               </a:rPr>
-              <a:t>วิธีนี้ดูเหมือนจะไม่สามารถใช้งานได้มากขึ้นเรื่อย ๆ</a:t>
+              <a:t>วิธีนี้ดูเหมือนจะสามารถใช้งานได้น้อยลงเรื่อย ๆ</a:t>
             </a:r>
           </a:p>
           <a:p>
@@ -13093,7 +13151,7 @@
             <a:r>
               <a:rPr lang="th-TH" dirty="0">
                 <a:solidFill>
-                  <a:srgbClr val="3366FF"/>
+                  <a:srgbClr val="CC0066"/>
                 </a:solidFill>
               </a:rPr>
               <a:t>โดยเฉพาะอย่างยิ่งสำหรับระบบเชิงพาณิชย์และอินเทอร์เน็ต</a:t>
@@ -13104,7 +13162,7 @@
             <a:r>
               <a:rPr lang="th-TH" dirty="0">
                 <a:solidFill>
-                  <a:srgbClr val="3366FF"/>
+                  <a:srgbClr val="CC0066"/>
                 </a:solidFill>
               </a:rPr>
               <a:t>แรงกดดันที่สำคัญคือ ค่าใช้จ่ายและเวลาที่จะวางตลาด</a:t>
@@ -13191,7 +13249,7 @@
           <a:p>
             <a:r>
               <a:rPr lang="th-TH"/>
-              <a:t>2561.10.09</a:t>
+              <a:t>2562.10.11</a:t>
             </a:r>
             <a:endParaRPr lang="th-TH" dirty="0"/>
           </a:p>
@@ -13657,7 +13715,7 @@
           <a:p>
             <a:r>
               <a:rPr lang="th-TH"/>
-              <a:t>2561.10.09</a:t>
+              <a:t>2562.10.11</a:t>
             </a:r>
             <a:endParaRPr lang="th-TH" dirty="0"/>
           </a:p>
@@ -13962,7 +14020,7 @@
           <a:p>
             <a:r>
               <a:rPr lang="th-TH"/>
-              <a:t>2561.10.09</a:t>
+              <a:t>2562.10.11</a:t>
             </a:r>
             <a:endParaRPr lang="th-TH" dirty="0"/>
           </a:p>
@@ -14231,7 +14289,7 @@
           <a:p>
             <a:r>
               <a:rPr lang="th-TH"/>
-              <a:t>2561.10.09</a:t>
+              <a:t>2562.10.11</a:t>
             </a:r>
             <a:endParaRPr lang="th-TH" dirty="0"/>
           </a:p>
@@ -14764,7 +14822,7 @@
           <a:p>
             <a:r>
               <a:rPr lang="th-TH"/>
-              <a:t>2561.10.09</a:t>
+              <a:t>2562.10.11</a:t>
             </a:r>
             <a:endParaRPr lang="th-TH" dirty="0"/>
           </a:p>
@@ -15030,7 +15088,7 @@
           <a:p>
             <a:r>
               <a:rPr lang="th-TH"/>
-              <a:t>2561.10.09</a:t>
+              <a:t>2562.10.11</a:t>
             </a:r>
             <a:endParaRPr lang="th-TH" dirty="0"/>
           </a:p>
@@ -15355,7 +15413,7 @@
           <a:p>
             <a:r>
               <a:rPr lang="th-TH"/>
-              <a:t>2561.10.09</a:t>
+              <a:t>2562.10.11</a:t>
             </a:r>
             <a:endParaRPr lang="th-TH" dirty="0"/>
           </a:p>
@@ -15544,7 +15602,7 @@
           <a:p>
             <a:r>
               <a:rPr lang="th-TH"/>
-              <a:t>2561.10.09</a:t>
+              <a:t>2562.10.11</a:t>
             </a:r>
             <a:endParaRPr lang="th-TH" dirty="0"/>
           </a:p>
@@ -16015,7 +16073,7 @@
           <a:p>
             <a:r>
               <a:rPr lang="th-TH"/>
-              <a:t>2561.10.09</a:t>
+              <a:t>2562.10.11</a:t>
             </a:r>
             <a:endParaRPr lang="th-TH" dirty="0"/>
           </a:p>
@@ -16202,7 +16260,7 @@
           <a:p>
             <a:r>
               <a:rPr lang="th-TH"/>
-              <a:t>2561.10.09</a:t>
+              <a:t>2562.10.11</a:t>
             </a:r>
             <a:endParaRPr lang="th-TH" dirty="0"/>
           </a:p>
@@ -16596,7 +16654,7 @@
           <a:p>
             <a:r>
               <a:rPr lang="th-TH"/>
-              <a:t>2561.10.09</a:t>
+              <a:t>2562.10.11</a:t>
             </a:r>
             <a:endParaRPr lang="th-TH" dirty="0"/>
           </a:p>
@@ -17047,7 +17105,7 @@
           <a:p>
             <a:r>
               <a:rPr lang="th-TH"/>
-              <a:t>2561.10.09</a:t>
+              <a:t>2562.10.11</a:t>
             </a:r>
             <a:endParaRPr lang="th-TH" dirty="0"/>
           </a:p>
@@ -17227,7 +17285,7 @@
           <a:p>
             <a:r>
               <a:rPr lang="th-TH"/>
-              <a:t>2561.10.09</a:t>
+              <a:t>2562.10.11</a:t>
             </a:r>
           </a:p>
         </p:txBody>
@@ -17410,7 +17468,7 @@
           <a:p>
             <a:r>
               <a:rPr lang="th-TH"/>
-              <a:t>2561.10.09</a:t>
+              <a:t>2562.10.11</a:t>
             </a:r>
           </a:p>
         </p:txBody>
@@ -17537,7 +17595,7 @@
           <a:p>
             <a:pPr marL="512763" indent="-512763"/>
             <a:r>
-              <a:rPr lang="th-TH">
+              <a:rPr lang="th-TH" dirty="0">
                 <a:solidFill>
                   <a:srgbClr val="3366FF"/>
                 </a:solidFill>
@@ -17569,23 +17627,7 @@
                   <a:srgbClr val="3366FF"/>
                 </a:solidFill>
               </a:rPr>
-              <a:t>จุดเริ่มต้นเกิด</a:t>
-            </a:r>
-            <a:r>
-              <a:rPr lang="th-TH">
-                <a:solidFill>
-                  <a:srgbClr val="3366FF"/>
-                </a:solidFill>
-              </a:rPr>
-              <a:t>จาก </a:t>
-            </a:r>
-            <a:r>
-              <a:rPr lang="en-US">
-                <a:solidFill>
-                  <a:srgbClr val="3366FF"/>
-                </a:solidFill>
-              </a:rPr>
-              <a:t>Free </a:t>
+              <a:t>จุดเริ่มต้นเกิดจาก </a:t>
             </a:r>
             <a:r>
               <a:rPr lang="en-US" dirty="0">
@@ -17593,7 +17635,7 @@
                   <a:srgbClr val="3366FF"/>
                 </a:solidFill>
               </a:rPr>
-              <a:t>Software Foundation (www.fsf.org) </a:t>
+              <a:t>Free Software Foundation (www.fsf.org) </a:t>
             </a:r>
             <a:r>
               <a:rPr lang="th-TH" dirty="0">
@@ -17607,7 +17649,7 @@
           <a:p>
             <a:pPr marL="512763" indent="-512763"/>
             <a:r>
-              <a:rPr lang="th-TH">
+              <a:rPr lang="th-TH" dirty="0">
                 <a:solidFill>
                   <a:srgbClr val="3366FF"/>
                 </a:solidFill>
@@ -17628,15 +17670,7 @@
                   <a:srgbClr val="3366FF"/>
                 </a:solidFill>
               </a:rPr>
-              <a:t>ขยายแนวคิดนี้โดยใช้อินเทอร์เน็ตเพื่อรับสมัครนักพัฒนาอาสาสมัครจำนวนมาก</a:t>
-            </a:r>
-            <a:r>
-              <a:rPr lang="th-TH">
-                <a:solidFill>
-                  <a:srgbClr val="3366FF"/>
-                </a:solidFill>
-              </a:rPr>
-              <a:t>ขึ้น </a:t>
+              <a:t>ขยายแนวคิดนี้โดยใช้อินเทอร์เน็ตเพื่อรับสมัครนักพัฒนาอาสาสมัครจำนวนมากขึ้น </a:t>
             </a:r>
             <a:endParaRPr lang="en-US" dirty="0">
               <a:solidFill>
@@ -17698,7 +17732,7 @@
           <a:p>
             <a:r>
               <a:rPr lang="th-TH"/>
-              <a:t>2561.10.09</a:t>
+              <a:t>2562.10.11</a:t>
             </a:r>
             <a:endParaRPr lang="th-TH" dirty="0"/>
           </a:p>
@@ -17822,82 +17856,164 @@
           <a:bodyPr/>
           <a:lstStyle/>
           <a:p>
-            <a:r>
-              <a:rPr lang="th-TH" dirty="0"/>
+            <a:pPr marL="512763" indent="-512763"/>
+            <a:r>
+              <a:rPr lang="th-TH" dirty="0">
+                <a:solidFill>
+                  <a:srgbClr val="3366FF"/>
+                </a:solidFill>
+              </a:rPr>
               <a:t>ผลิตภัณฑ์</a:t>
             </a:r>
             <a:r>
-              <a:rPr lang="en-US" dirty="0"/>
+              <a:rPr lang="en-US" dirty="0">
+                <a:solidFill>
+                  <a:srgbClr val="3366FF"/>
+                </a:solidFill>
+              </a:rPr>
               <a:t> open source </a:t>
             </a:r>
             <a:r>
-              <a:rPr lang="th-TH" dirty="0"/>
+              <a:rPr lang="th-TH" dirty="0">
+                <a:solidFill>
+                  <a:srgbClr val="3366FF"/>
+                </a:solidFill>
+              </a:rPr>
               <a:t>ที่รู้จักกันดีคือระบบปฏิบัติการ </a:t>
             </a:r>
             <a:r>
-              <a:rPr lang="en-US" dirty="0"/>
+              <a:rPr lang="en-US" dirty="0">
+                <a:solidFill>
+                  <a:srgbClr val="3366FF"/>
+                </a:solidFill>
+              </a:rPr>
               <a:t>Linux </a:t>
             </a:r>
             <a:r>
-              <a:rPr lang="th-TH" dirty="0"/>
+              <a:rPr lang="th-TH" dirty="0">
+                <a:solidFill>
+                  <a:srgbClr val="3366FF"/>
+                </a:solidFill>
+              </a:rPr>
               <a:t>ซึ่งใช้กันอย่างแพร่หลายในฐานะระบบ</a:t>
             </a:r>
             <a:r>
-              <a:rPr lang="th-TH" dirty="0" err="1"/>
+              <a:rPr lang="th-TH" dirty="0" err="1">
+                <a:solidFill>
+                  <a:srgbClr val="3366FF"/>
+                </a:solidFill>
+              </a:rPr>
               <a:t>เซิร์ฟเวอร์</a:t>
             </a:r>
             <a:r>
-              <a:rPr lang="th-TH" dirty="0"/>
+              <a:rPr lang="th-TH" dirty="0">
+                <a:solidFill>
+                  <a:srgbClr val="3366FF"/>
+                </a:solidFill>
+              </a:rPr>
               <a:t>และเป็นสภาพแวดล้อม</a:t>
             </a:r>
             <a:r>
-              <a:rPr lang="th-TH" dirty="0" err="1"/>
+              <a:rPr lang="th-TH" dirty="0" err="1">
+                <a:solidFill>
+                  <a:srgbClr val="3366FF"/>
+                </a:solidFill>
+              </a:rPr>
               <a:t>เดสก์ท็อป</a:t>
             </a:r>
-            <a:endParaRPr lang="th-TH" dirty="0"/>
-          </a:p>
-          <a:p>
-            <a:r>
-              <a:rPr lang="th-TH" dirty="0"/>
+            <a:endParaRPr lang="th-TH" dirty="0">
+              <a:solidFill>
+                <a:srgbClr val="3366FF"/>
+              </a:solidFill>
+            </a:endParaRPr>
+          </a:p>
+          <a:p>
+            <a:pPr marL="512763" indent="-512763"/>
+            <a:r>
+              <a:rPr lang="th-TH" dirty="0">
+                <a:solidFill>
+                  <a:srgbClr val="3366FF"/>
+                </a:solidFill>
+              </a:rPr>
               <a:t>ผลิตภัณฑ์</a:t>
             </a:r>
             <a:r>
-              <a:rPr lang="en-US" dirty="0"/>
+              <a:rPr lang="en-US" dirty="0">
+                <a:solidFill>
+                  <a:srgbClr val="3366FF"/>
+                </a:solidFill>
+              </a:rPr>
               <a:t> open source  </a:t>
             </a:r>
             <a:r>
-              <a:rPr lang="th-TH" dirty="0"/>
+              <a:rPr lang="th-TH" dirty="0">
+                <a:solidFill>
+                  <a:srgbClr val="3366FF"/>
+                </a:solidFill>
+              </a:rPr>
               <a:t>ที่สำคัญอื่น ๆ ได้แก่ </a:t>
             </a:r>
             <a:r>
-              <a:rPr lang="en-US" dirty="0"/>
+              <a:rPr lang="en-US" dirty="0">
+                <a:solidFill>
+                  <a:srgbClr val="3366FF"/>
+                </a:solidFill>
+              </a:rPr>
               <a:t>Java, </a:t>
             </a:r>
             <a:r>
-              <a:rPr lang="th-TH" dirty="0"/>
+              <a:rPr lang="th-TH" dirty="0">
+                <a:solidFill>
+                  <a:srgbClr val="3366FF"/>
+                </a:solidFill>
+              </a:rPr>
               <a:t>เว็บ</a:t>
             </a:r>
             <a:r>
-              <a:rPr lang="th-TH" dirty="0" err="1"/>
+              <a:rPr lang="th-TH" dirty="0" err="1">
+                <a:solidFill>
+                  <a:srgbClr val="3366FF"/>
+                </a:solidFill>
+              </a:rPr>
               <a:t>เซิร์ฟเวอร์</a:t>
             </a:r>
             <a:r>
-              <a:rPr lang="th-TH" dirty="0"/>
+              <a:rPr lang="th-TH" dirty="0">
+                <a:solidFill>
+                  <a:srgbClr val="3366FF"/>
+                </a:solidFill>
+              </a:rPr>
               <a:t> </a:t>
             </a:r>
             <a:r>
-              <a:rPr lang="en-US" dirty="0"/>
+              <a:rPr lang="en-US" dirty="0">
+                <a:solidFill>
+                  <a:srgbClr val="3366FF"/>
+                </a:solidFill>
+              </a:rPr>
               <a:t>Apache </a:t>
             </a:r>
             <a:r>
-              <a:rPr lang="th-TH" dirty="0"/>
+              <a:rPr lang="th-TH" dirty="0">
+                <a:solidFill>
+                  <a:srgbClr val="3366FF"/>
+                </a:solidFill>
+              </a:rPr>
               <a:t>และระบบจัดการฐานข้อมูล </a:t>
             </a:r>
             <a:r>
-              <a:rPr lang="en-US" dirty="0" err="1"/>
+              <a:rPr lang="en-US" dirty="0" err="1">
+                <a:solidFill>
+                  <a:srgbClr val="3366FF"/>
+                </a:solidFill>
+              </a:rPr>
               <a:t>mySQL</a:t>
             </a:r>
-            <a:endParaRPr lang="th-TH" dirty="0"/>
+            <a:endParaRPr lang="th-TH" dirty="0">
+              <a:solidFill>
+                <a:srgbClr val="3366FF"/>
+              </a:solidFill>
+            </a:endParaRPr>
           </a:p>
         </p:txBody>
       </p:sp>
@@ -17953,7 +18069,7 @@
           <a:p>
             <a:r>
               <a:rPr lang="th-TH"/>
-              <a:t>2561.10.09</a:t>
+              <a:t>2562.10.11</a:t>
             </a:r>
             <a:endParaRPr lang="th-TH" dirty="0"/>
           </a:p>
@@ -18077,30 +18193,56 @@
           <a:bodyPr/>
           <a:lstStyle/>
           <a:p>
-            <a:r>
-              <a:rPr lang="th-TH" dirty="0"/>
+            <a:pPr marL="512763" indent="-512763"/>
+            <a:r>
+              <a:rPr lang="th-TH" dirty="0">
+                <a:solidFill>
+                  <a:srgbClr val="3366FF"/>
+                </a:solidFill>
+              </a:rPr>
               <a:t>ผลิตภัณฑ์ที่มีการพัฒนาควรใช้ส่วนประกอบ</a:t>
             </a:r>
             <a:r>
-              <a:rPr lang="en-US" dirty="0"/>
+              <a:rPr lang="en-US" dirty="0">
+                <a:solidFill>
+                  <a:srgbClr val="3366FF"/>
+                </a:solidFill>
+              </a:rPr>
               <a:t> open source </a:t>
             </a:r>
             <a:r>
-              <a:rPr lang="th-TH" dirty="0"/>
+              <a:rPr lang="th-TH" dirty="0">
+                <a:solidFill>
+                  <a:srgbClr val="3366FF"/>
+                </a:solidFill>
+              </a:rPr>
               <a:t>หรือไม่?</a:t>
             </a:r>
           </a:p>
           <a:p>
-            <a:r>
-              <a:rPr lang="th-TH" dirty="0"/>
+            <a:pPr marL="512763" indent="-512763"/>
+            <a:r>
+              <a:rPr lang="th-TH" dirty="0">
+                <a:solidFill>
+                  <a:srgbClr val="3366FF"/>
+                </a:solidFill>
+              </a:rPr>
               <a:t>ควรใช้วิธี</a:t>
             </a:r>
             <a:r>
-              <a:rPr lang="en-US" dirty="0"/>
+              <a:rPr lang="en-US" dirty="0">
+                <a:solidFill>
+                  <a:srgbClr val="3366FF"/>
+                </a:solidFill>
+              </a:rPr>
               <a:t> open source </a:t>
             </a:r>
             <a:r>
-              <a:rPr lang="th-TH" dirty="0"/>
+              <a:rPr lang="th-TH" dirty="0">
+                <a:solidFill>
+                  <a:srgbClr val="3366FF"/>
+                </a:solidFill>
+              </a:rPr>
               <a:t>เพื่อการพัฒนาซอฟต์แวร์หรือไม่?</a:t>
             </a:r>
           </a:p>
@@ -18158,7 +18300,7 @@
           <a:p>
             <a:r>
               <a:rPr lang="th-TH"/>
-              <a:t>2561.10.09</a:t>
+              <a:t>2562.10.11</a:t>
             </a:r>
             <a:endParaRPr lang="th-TH" dirty="0"/>
           </a:p>
@@ -18477,7 +18619,7 @@
           <a:p>
             <a:r>
               <a:rPr lang="th-TH"/>
-              <a:t>2561.10.09</a:t>
+              <a:t>2562.10.11</a:t>
             </a:r>
             <a:endParaRPr lang="th-TH" dirty="0"/>
           </a:p>
@@ -18642,7 +18784,7 @@
                   <a:srgbClr val="CC0066"/>
                 </a:solidFill>
               </a:rPr>
-              <a:t>แต่ไม่ได้หมายความว่าทุกคนสามารถทุกย่างที่ต้องการกับซอร์สโค้ดนั้น</a:t>
+              <a:t>แต่ไม่ได้หมายความว่าทุกคนสามารถทำทุกย่างที่ต้องการกับซอร์สโค้ดนั้น</a:t>
             </a:r>
           </a:p>
           <a:p>
@@ -18905,7 +19047,7 @@
           <a:p>
             <a:r>
               <a:rPr lang="th-TH"/>
-              <a:t>2561.10.09</a:t>
+              <a:t>2562.10.11</a:t>
             </a:r>
             <a:endParaRPr lang="th-TH" dirty="0"/>
           </a:p>
@@ -19394,7 +19536,7 @@
           <a:p>
             <a:r>
               <a:rPr lang="th-TH"/>
-              <a:t>2561.10.09</a:t>
+              <a:t>2562.10.11</a:t>
             </a:r>
             <a:endParaRPr lang="th-TH" dirty="0"/>
           </a:p>
@@ -19527,15 +19669,7 @@
                   <a:srgbClr val="3366FF"/>
                 </a:solidFill>
               </a:rPr>
-              <a:t>สร้างระบบ เพื่อดูแลรักษาข้อมูลเกี่ยวกับ</a:t>
-            </a:r>
-            <a:r>
-              <a:rPr lang="th-TH">
-                <a:solidFill>
-                  <a:srgbClr val="3366FF"/>
-                </a:solidFill>
-              </a:rPr>
-              <a:t>ส่วนประกอบ </a:t>
+              <a:t>สร้างระบบ เพื่อดูแลรักษาข้อมูลเกี่ยวกับส่วนประกอบ </a:t>
             </a:r>
             <a:r>
               <a:rPr lang="en-US" dirty="0">
@@ -19562,15 +19696,7 @@
                   <a:srgbClr val="3366FF"/>
                 </a:solidFill>
               </a:rPr>
-              <a:t>ศึกษาถึงใบอนุญาตประเภทต่าง ๆ และทำความเข้าใจ</a:t>
-            </a:r>
-            <a:r>
-              <a:rPr lang="th-TH">
-                <a:solidFill>
-                  <a:srgbClr val="3366FF"/>
-                </a:solidFill>
-              </a:rPr>
-              <a:t>ว่า </a:t>
+              <a:t>ศึกษาถึงใบอนุญาตประเภทต่าง ๆ และทำความเข้าใจว่า </a:t>
             </a:r>
             <a:r>
               <a:rPr lang="en-US" dirty="0">
@@ -19597,7 +19723,7 @@
                   <a:srgbClr val="3366FF"/>
                 </a:solidFill>
               </a:rPr>
-              <a:t>ระวังเส้นทางการพัฒนาของส่วนประกอบต่างๆ</a:t>
+              <a:t>เฝ้าระวัง-ดูแล เส้นทางการพัฒนาของส่วนประกอบต่างๆ</a:t>
             </a:r>
           </a:p>
           <a:p>
@@ -19608,15 +19734,7 @@
                   <a:srgbClr val="3366FF"/>
                 </a:solidFill>
               </a:rPr>
-              <a:t>ให้ความรู้บุคคลต่าง ๆ </a:t>
-            </a:r>
-            <a:r>
-              <a:rPr lang="th-TH">
-                <a:solidFill>
-                  <a:srgbClr val="3366FF"/>
-                </a:solidFill>
-              </a:rPr>
-              <a:t>เกี่ยวกับ </a:t>
+              <a:t>ให้ความรู้บุคคลต่าง ๆ เกี่ยวกับ </a:t>
             </a:r>
             <a:r>
               <a:rPr lang="en-US" dirty="0">
@@ -19640,15 +19758,7 @@
                   <a:srgbClr val="3366FF"/>
                 </a:solidFill>
               </a:rPr>
-              <a:t>ให้มีการตรวจสอบระบบได้ </a:t>
-            </a:r>
-            <a:r>
-              <a:rPr lang="th-TH">
-                <a:solidFill>
-                  <a:srgbClr val="3366FF"/>
-                </a:solidFill>
-              </a:rPr>
-              <a:t>ว่ามี</a:t>
+              <a:t>ให้มีการตรวจสอบระบบได้ ว่ามี</a:t>
             </a:r>
             <a:r>
               <a:rPr lang="en-US" dirty="0">
@@ -19675,15 +19785,7 @@
                   <a:srgbClr val="3366FF"/>
                 </a:solidFill>
               </a:rPr>
-              <a:t>มีส่วนร่วม</a:t>
-            </a:r>
-            <a:r>
-              <a:rPr lang="th-TH">
-                <a:solidFill>
-                  <a:srgbClr val="3366FF"/>
-                </a:solidFill>
-              </a:rPr>
-              <a:t>ในชุมชน</a:t>
+              <a:t>มีส่วนร่วมในชุมชน</a:t>
             </a:r>
             <a:r>
               <a:rPr lang="en-US" dirty="0">
@@ -19753,7 +19855,7 @@
           <a:p>
             <a:r>
               <a:rPr lang="th-TH"/>
-              <a:t>2561.10.09</a:t>
+              <a:t>2562.10.11</a:t>
             </a:r>
             <a:endParaRPr lang="th-TH" dirty="0"/>
           </a:p>
@@ -20275,7 +20377,7 @@
           <a:p>
             <a:r>
               <a:rPr lang="th-TH"/>
-              <a:t>2561.10.09</a:t>
+              <a:t>2562.10.11</a:t>
             </a:r>
             <a:endParaRPr lang="th-TH" dirty="0"/>
           </a:p>
@@ -20717,7 +20819,7 @@
           <a:p>
             <a:r>
               <a:rPr lang="th-TH"/>
-              <a:t>2561.10.09</a:t>
+              <a:t>2562.10.11</a:t>
             </a:r>
             <a:endParaRPr lang="th-TH" dirty="0"/>
           </a:p>
@@ -20892,7 +20994,7 @@
           <a:p>
             <a:r>
               <a:rPr lang="th-TH"/>
-              <a:t>2561.10.09</a:t>
+              <a:t>2562.10.11</a:t>
             </a:r>
             <a:endParaRPr lang="th-TH" dirty="0"/>
           </a:p>
@@ -21120,7 +21222,7 @@
           <a:p>
             <a:r>
               <a:rPr lang="th-TH"/>
-              <a:t>2561.10.09</a:t>
+              <a:t>2562.10.11</a:t>
             </a:r>
             <a:endParaRPr lang="th-TH" dirty="0"/>
           </a:p>
@@ -21389,7 +21491,7 @@
           <a:p>
             <a:r>
               <a:rPr lang="th-TH"/>
-              <a:t>2561.10.09</a:t>
+              <a:t>2562.10.11</a:t>
             </a:r>
             <a:endParaRPr lang="th-TH" dirty="0"/>
           </a:p>
@@ -21641,7 +21743,7 @@
           <a:p>
             <a:r>
               <a:rPr lang="th-TH"/>
-              <a:t>2561.10.09</a:t>
+              <a:t>2562.10.11</a:t>
             </a:r>
             <a:endParaRPr lang="th-TH" dirty="0"/>
           </a:p>
@@ -21962,7 +22064,7 @@
           <a:p>
             <a:r>
               <a:rPr lang="th-TH"/>
-              <a:t>2561.10.09</a:t>
+              <a:t>2562.10.11</a:t>
             </a:r>
             <a:endParaRPr lang="th-TH" dirty="0"/>
           </a:p>

</xml_diff>